<commit_message>
Added extra info hand out and updated images in powerpoint and write up document.
</commit_message>
<xml_diff>
--- a/Renewable Energy Production in California.pptx
+++ b/Renewable Energy Production in California.pptx
@@ -12,11 +12,12 @@
     <p:sldId id="260" r:id="rId6"/>
     <p:sldId id="261" r:id="rId7"/>
     <p:sldId id="262" r:id="rId8"/>
-    <p:sldId id="263" r:id="rId9"/>
-    <p:sldId id="264" r:id="rId10"/>
-    <p:sldId id="265" r:id="rId11"/>
-    <p:sldId id="266" r:id="rId12"/>
-    <p:sldId id="268" r:id="rId13"/>
+    <p:sldId id="269" r:id="rId9"/>
+    <p:sldId id="263" r:id="rId10"/>
+    <p:sldId id="264" r:id="rId11"/>
+    <p:sldId id="265" r:id="rId12"/>
+    <p:sldId id="266" r:id="rId13"/>
+    <p:sldId id="268" r:id="rId14"/>
   </p:sldIdLst>
   <p:sldSz cx="12192000" cy="6858000"/>
   <p:notesSz cx="6858000" cy="9144000"/>
@@ -270,7 +271,7 @@
           <a:p>
             <a:fld id="{BB9DC0CB-D0A9-4203-AA34-A91289CF0814}" type="datetimeFigureOut">
               <a:rPr lang="en-US" smtClean="0"/>
-              <a:t>11/4/2019</a:t>
+              <a:t>11/6/2019</a:t>
             </a:fld>
             <a:endParaRPr lang="en-US"/>
           </a:p>
@@ -468,7 +469,7 @@
           <a:p>
             <a:fld id="{BB9DC0CB-D0A9-4203-AA34-A91289CF0814}" type="datetimeFigureOut">
               <a:rPr lang="en-US" smtClean="0"/>
-              <a:t>11/4/2019</a:t>
+              <a:t>11/6/2019</a:t>
             </a:fld>
             <a:endParaRPr lang="en-US"/>
           </a:p>
@@ -676,7 +677,7 @@
           <a:p>
             <a:fld id="{BB9DC0CB-D0A9-4203-AA34-A91289CF0814}" type="datetimeFigureOut">
               <a:rPr lang="en-US" smtClean="0"/>
-              <a:t>11/4/2019</a:t>
+              <a:t>11/6/2019</a:t>
             </a:fld>
             <a:endParaRPr lang="en-US"/>
           </a:p>
@@ -874,7 +875,7 @@
           <a:p>
             <a:fld id="{BB9DC0CB-D0A9-4203-AA34-A91289CF0814}" type="datetimeFigureOut">
               <a:rPr lang="en-US" smtClean="0"/>
-              <a:t>11/4/2019</a:t>
+              <a:t>11/6/2019</a:t>
             </a:fld>
             <a:endParaRPr lang="en-US"/>
           </a:p>
@@ -1149,7 +1150,7 @@
           <a:p>
             <a:fld id="{BB9DC0CB-D0A9-4203-AA34-A91289CF0814}" type="datetimeFigureOut">
               <a:rPr lang="en-US" smtClean="0"/>
-              <a:t>11/4/2019</a:t>
+              <a:t>11/6/2019</a:t>
             </a:fld>
             <a:endParaRPr lang="en-US"/>
           </a:p>
@@ -1414,7 +1415,7 @@
           <a:p>
             <a:fld id="{BB9DC0CB-D0A9-4203-AA34-A91289CF0814}" type="datetimeFigureOut">
               <a:rPr lang="en-US" smtClean="0"/>
-              <a:t>11/4/2019</a:t>
+              <a:t>11/6/2019</a:t>
             </a:fld>
             <a:endParaRPr lang="en-US"/>
           </a:p>
@@ -1826,7 +1827,7 @@
           <a:p>
             <a:fld id="{BB9DC0CB-D0A9-4203-AA34-A91289CF0814}" type="datetimeFigureOut">
               <a:rPr lang="en-US" smtClean="0"/>
-              <a:t>11/4/2019</a:t>
+              <a:t>11/6/2019</a:t>
             </a:fld>
             <a:endParaRPr lang="en-US"/>
           </a:p>
@@ -1967,7 +1968,7 @@
           <a:p>
             <a:fld id="{BB9DC0CB-D0A9-4203-AA34-A91289CF0814}" type="datetimeFigureOut">
               <a:rPr lang="en-US" smtClean="0"/>
-              <a:t>11/4/2019</a:t>
+              <a:t>11/6/2019</a:t>
             </a:fld>
             <a:endParaRPr lang="en-US"/>
           </a:p>
@@ -2080,7 +2081,7 @@
           <a:p>
             <a:fld id="{BB9DC0CB-D0A9-4203-AA34-A91289CF0814}" type="datetimeFigureOut">
               <a:rPr lang="en-US" smtClean="0"/>
-              <a:t>11/4/2019</a:t>
+              <a:t>11/6/2019</a:t>
             </a:fld>
             <a:endParaRPr lang="en-US"/>
           </a:p>
@@ -2391,7 +2392,7 @@
           <a:p>
             <a:fld id="{BB9DC0CB-D0A9-4203-AA34-A91289CF0814}" type="datetimeFigureOut">
               <a:rPr lang="en-US" smtClean="0"/>
-              <a:t>11/4/2019</a:t>
+              <a:t>11/6/2019</a:t>
             </a:fld>
             <a:endParaRPr lang="en-US"/>
           </a:p>
@@ -2679,7 +2680,7 @@
           <a:p>
             <a:fld id="{BB9DC0CB-D0A9-4203-AA34-A91289CF0814}" type="datetimeFigureOut">
               <a:rPr lang="en-US" smtClean="0"/>
-              <a:t>11/4/2019</a:t>
+              <a:t>11/6/2019</a:t>
             </a:fld>
             <a:endParaRPr lang="en-US"/>
           </a:p>
@@ -2920,7 +2921,7 @@
           <a:p>
             <a:fld id="{BB9DC0CB-D0A9-4203-AA34-A91289CF0814}" type="datetimeFigureOut">
               <a:rPr lang="en-US" smtClean="0"/>
-              <a:t>11/4/2019</a:t>
+              <a:t>11/6/2019</a:t>
             </a:fld>
             <a:endParaRPr lang="en-US"/>
           </a:p>
@@ -3853,7 +3854,7 @@
           <p:cNvPr id="6" name="Title 1">
             <a:extLst>
               <a:ext uri="{FF2B5EF4-FFF2-40B4-BE49-F238E27FC236}">
-                <a16:creationId xmlns:a16="http://schemas.microsoft.com/office/drawing/2014/main" id="{A4B7AF37-CAD1-4D8B-B889-48D16C71E074}"/>
+                <a16:creationId xmlns:a16="http://schemas.microsoft.com/office/drawing/2014/main" id="{A0831C76-8C71-4220-B246-9FF658021ADB}"/>
               </a:ext>
             </a:extLst>
           </p:cNvPr>
@@ -3878,8 +3879,12 @@
           <a:p>
             <a:r>
               <a:rPr lang="en-US" sz="3200" dirty="0"/>
-              <a:t>By 2017, California was close to the goal of 33% renewable energy production.</a:t>
-            </a:r>
+              <a:t>Wind power varies less and is most productive when solar is not.</a:t>
+            </a:r>
+            <a:br>
+              <a:rPr lang="en-US" sz="3200" dirty="0"/>
+            </a:br>
+            <a:endParaRPr lang="en-US" sz="3200" dirty="0"/>
           </a:p>
         </p:txBody>
       </p:sp>
@@ -3888,7 +3893,7 @@
           <p:cNvPr id="7" name="Content Placeholder 6" descr="A screenshot of a cell phone&#10;&#10;Description automatically generated">
             <a:extLst>
               <a:ext uri="{FF2B5EF4-FFF2-40B4-BE49-F238E27FC236}">
-                <a16:creationId xmlns:a16="http://schemas.microsoft.com/office/drawing/2014/main" id="{1CAB9A5A-9BC8-4E3B-9469-09551F0EE4AD}"/>
+                <a16:creationId xmlns:a16="http://schemas.microsoft.com/office/drawing/2014/main" id="{C9693274-A193-40BB-B825-ECF8E1AFC4D5}"/>
               </a:ext>
             </a:extLst>
           </p:cNvPr>
@@ -3913,15 +3918,15 @@
         </p:blipFill>
         <p:spPr>
           <a:xfrm>
-            <a:off x="954505" y="1303733"/>
-            <a:ext cx="10282990" cy="5085696"/>
+            <a:off x="1190023" y="1177050"/>
+            <a:ext cx="9811954" cy="5512507"/>
           </a:xfrm>
         </p:spPr>
       </p:pic>
     </p:spTree>
     <p:extLst>
       <p:ext uri="{BB962C8B-B14F-4D97-AF65-F5344CB8AC3E}">
-        <p14:creationId xmlns:p14="http://schemas.microsoft.com/office/powerpoint/2010/main" val="3233333523"/>
+        <p14:creationId xmlns:p14="http://schemas.microsoft.com/office/powerpoint/2010/main" val="1349563111"/>
       </p:ext>
     </p:extLst>
   </p:cSld>
@@ -3950,6 +3955,106 @@
       </p:grpSpPr>
       <p:sp>
         <p:nvSpPr>
+          <p:cNvPr id="6" name="Title 1">
+            <a:extLst>
+              <a:ext uri="{FF2B5EF4-FFF2-40B4-BE49-F238E27FC236}">
+                <a16:creationId xmlns:a16="http://schemas.microsoft.com/office/drawing/2014/main" id="{A4B7AF37-CAD1-4D8B-B889-48D16C71E074}"/>
+              </a:ext>
+            </a:extLst>
+          </p:cNvPr>
+          <p:cNvSpPr>
+            <a:spLocks noGrp="1"/>
+          </p:cNvSpPr>
+          <p:nvPr>
+            <p:ph type="title"/>
+          </p:nvPr>
+        </p:nvSpPr>
+        <p:spPr>
+          <a:xfrm>
+            <a:off x="404261" y="18255"/>
+            <a:ext cx="11377061" cy="1325563"/>
+          </a:xfrm>
+        </p:spPr>
+        <p:txBody>
+          <a:bodyPr>
+            <a:normAutofit/>
+          </a:bodyPr>
+          <a:lstStyle/>
+          <a:p>
+            <a:r>
+              <a:rPr lang="en-US" sz="3200" dirty="0"/>
+              <a:t>By 2017, California was close to the goal of 33% renewable energy production.</a:t>
+            </a:r>
+          </a:p>
+        </p:txBody>
+      </p:sp>
+      <p:pic>
+        <p:nvPicPr>
+          <p:cNvPr id="7" name="Content Placeholder 6" descr="A screenshot of a cell phone&#10;&#10;Description automatically generated">
+            <a:extLst>
+              <a:ext uri="{FF2B5EF4-FFF2-40B4-BE49-F238E27FC236}">
+                <a16:creationId xmlns:a16="http://schemas.microsoft.com/office/drawing/2014/main" id="{1CAB9A5A-9BC8-4E3B-9469-09551F0EE4AD}"/>
+              </a:ext>
+            </a:extLst>
+          </p:cNvPr>
+          <p:cNvPicPr>
+            <a:picLocks noGrp="1" noChangeAspect="1"/>
+          </p:cNvPicPr>
+          <p:nvPr>
+            <p:ph idx="1"/>
+          </p:nvPr>
+        </p:nvPicPr>
+        <p:blipFill>
+          <a:blip r:embed="rId2">
+            <a:extLst>
+              <a:ext uri="{28A0092B-C50C-407E-A947-70E740481C1C}">
+                <a14:useLocalDpi xmlns:a14="http://schemas.microsoft.com/office/drawing/2010/main" val="0"/>
+              </a:ext>
+            </a:extLst>
+          </a:blip>
+          <a:stretch>
+            <a:fillRect/>
+          </a:stretch>
+        </p:blipFill>
+        <p:spPr>
+          <a:xfrm>
+            <a:off x="954505" y="1303733"/>
+            <a:ext cx="10282990" cy="5085696"/>
+          </a:xfrm>
+        </p:spPr>
+      </p:pic>
+    </p:spTree>
+    <p:extLst>
+      <p:ext uri="{BB962C8B-B14F-4D97-AF65-F5344CB8AC3E}">
+        <p14:creationId xmlns:p14="http://schemas.microsoft.com/office/powerpoint/2010/main" val="3233333523"/>
+      </p:ext>
+    </p:extLst>
+  </p:cSld>
+  <p:clrMapOvr>
+    <a:masterClrMapping/>
+  </p:clrMapOvr>
+</p:sld>
+</file>
+
+<file path=ppt/slides/slide12.xml><?xml version="1.0" encoding="utf-8"?>
+<p:sld xmlns:a="http://schemas.openxmlformats.org/drawingml/2006/main" xmlns:r="http://schemas.openxmlformats.org/officeDocument/2006/relationships" xmlns:p="http://schemas.openxmlformats.org/presentationml/2006/main">
+  <p:cSld>
+    <p:spTree>
+      <p:nvGrpSpPr>
+        <p:cNvPr id="1" name=""/>
+        <p:cNvGrpSpPr/>
+        <p:nvPr/>
+      </p:nvGrpSpPr>
+      <p:grpSpPr>
+        <a:xfrm>
+          <a:off x="0" y="0"/>
+          <a:ext cx="0" cy="0"/>
+          <a:chOff x="0" y="0"/>
+          <a:chExt cx="0" cy="0"/>
+        </a:xfrm>
+      </p:grpSpPr>
+      <p:sp>
+        <p:nvSpPr>
           <p:cNvPr id="9" name="Title 1">
             <a:extLst>
               <a:ext uri="{FF2B5EF4-FFF2-40B4-BE49-F238E27FC236}">
@@ -4031,7 +4136,7 @@
 </p:sld>
 </file>
 
-<file path=ppt/slides/slide12.xml><?xml version="1.0" encoding="utf-8"?>
+<file path=ppt/slides/slide13.xml><?xml version="1.0" encoding="utf-8"?>
 <p:sld xmlns:a="http://schemas.openxmlformats.org/drawingml/2006/main" xmlns:r="http://schemas.openxmlformats.org/officeDocument/2006/relationships" xmlns:p="http://schemas.openxmlformats.org/presentationml/2006/main">
   <p:cSld>
     <p:bg>
@@ -5389,6 +5494,42 @@
           <a:chExt cx="0" cy="0"/>
         </a:xfrm>
       </p:grpSpPr>
+      <p:pic>
+        <p:nvPicPr>
+          <p:cNvPr id="12" name="Picture 11" descr="A picture containing screenshot&#10;&#10;Description automatically generated">
+            <a:extLst>
+              <a:ext uri="{FF2B5EF4-FFF2-40B4-BE49-F238E27FC236}">
+                <a16:creationId xmlns:a16="http://schemas.microsoft.com/office/drawing/2014/main" id="{41831117-FC54-455E-96EC-F925A54959B3}"/>
+              </a:ext>
+            </a:extLst>
+          </p:cNvPr>
+          <p:cNvPicPr>
+            <a:picLocks noChangeAspect="1"/>
+          </p:cNvPicPr>
+          <p:nvPr/>
+        </p:nvPicPr>
+        <p:blipFill>
+          <a:blip r:embed="rId2">
+            <a:extLst>
+              <a:ext uri="{28A0092B-C50C-407E-A947-70E740481C1C}">
+                <a14:useLocalDpi xmlns:a14="http://schemas.microsoft.com/office/drawing/2010/main" val="0"/>
+              </a:ext>
+            </a:extLst>
+          </a:blip>
+          <a:stretch>
+            <a:fillRect/>
+          </a:stretch>
+        </p:blipFill>
+        <p:spPr>
+          <a:xfrm>
+            <a:off x="1720391" y="139221"/>
+            <a:ext cx="11103203" cy="3138949"/>
+          </a:xfrm>
+          <a:prstGeom prst="rect">
+            <a:avLst/>
+          </a:prstGeom>
+        </p:spPr>
+      </p:pic>
       <p:sp>
         <p:nvSpPr>
           <p:cNvPr id="9" name="TextBox 8">
@@ -5435,44 +5576,10 @@
       </p:sp>
       <p:pic>
         <p:nvPicPr>
-          <p:cNvPr id="6" name="Content Placeholder 5" descr="A screenshot of a cell phone&#10;&#10;Description automatically generated">
-            <a:extLst>
-              <a:ext uri="{FF2B5EF4-FFF2-40B4-BE49-F238E27FC236}">
-                <a16:creationId xmlns:a16="http://schemas.microsoft.com/office/drawing/2014/main" id="{CA7CFAD9-B340-4DA4-BD44-D6579C35B83D}"/>
-              </a:ext>
-            </a:extLst>
-          </p:cNvPr>
-          <p:cNvPicPr>
-            <a:picLocks noGrp="1" noChangeAspect="1"/>
-          </p:cNvPicPr>
-          <p:nvPr>
-            <p:ph idx="1"/>
-          </p:nvPr>
-        </p:nvPicPr>
-        <p:blipFill rotWithShape="1">
-          <a:blip r:embed="rId2">
-            <a:extLst>
-              <a:ext uri="{28A0092B-C50C-407E-A947-70E740481C1C}">
-                <a14:useLocalDpi xmlns:a14="http://schemas.microsoft.com/office/drawing/2010/main" val="0"/>
-              </a:ext>
-            </a:extLst>
-          </a:blip>
-          <a:srcRect l="3596" r="4221" b="5147"/>
-          <a:stretch/>
-        </p:blipFill>
-        <p:spPr>
-          <a:xfrm>
-            <a:off x="2136808" y="275948"/>
-            <a:ext cx="10055192" cy="2956118"/>
-          </a:xfrm>
-        </p:spPr>
-      </p:pic>
-      <p:pic>
-        <p:nvPicPr>
-          <p:cNvPr id="10" name="Picture 9" descr="A close up of a map&#10;&#10;Description automatically generated">
-            <a:extLst>
-              <a:ext uri="{FF2B5EF4-FFF2-40B4-BE49-F238E27FC236}">
-                <a16:creationId xmlns:a16="http://schemas.microsoft.com/office/drawing/2014/main" id="{38FBC211-E75D-4D97-B808-DB319A97064C}"/>
+          <p:cNvPr id="14" name="Picture 13" descr="A close up of a map&#10;&#10;Description automatically generated">
+            <a:extLst>
+              <a:ext uri="{FF2B5EF4-FFF2-40B4-BE49-F238E27FC236}">
+                <a16:creationId xmlns:a16="http://schemas.microsoft.com/office/drawing/2014/main" id="{532C4A98-77E5-4914-967D-703430309DE4}"/>
               </a:ext>
             </a:extLst>
           </p:cNvPr>
@@ -5481,7 +5588,7 @@
           </p:cNvPicPr>
           <p:nvPr/>
         </p:nvPicPr>
-        <p:blipFill rotWithShape="1">
+        <p:blipFill>
           <a:blip r:embed="rId3">
             <a:extLst>
               <a:ext uri="{28A0092B-C50C-407E-A947-70E740481C1C}">
@@ -5489,13 +5596,14 @@
               </a:ext>
             </a:extLst>
           </a:blip>
-          <a:srcRect l="3596" r="4221" b="5147"/>
-          <a:stretch/>
+          <a:stretch>
+            <a:fillRect/>
+          </a:stretch>
         </p:blipFill>
         <p:spPr>
           <a:xfrm>
-            <a:off x="2136808" y="3611831"/>
-            <a:ext cx="10055191" cy="2956118"/>
+            <a:off x="1640262" y="3429000"/>
+            <a:ext cx="11263459" cy="3138949"/>
           </a:xfrm>
           <a:prstGeom prst="rect">
             <a:avLst/>
@@ -5518,6 +5626,14 @@
 <file path=ppt/slides/slide8.xml><?xml version="1.0" encoding="utf-8"?>
 <p:sld xmlns:a="http://schemas.openxmlformats.org/drawingml/2006/main" xmlns:r="http://schemas.openxmlformats.org/officeDocument/2006/relationships" xmlns:p="http://schemas.openxmlformats.org/presentationml/2006/main">
   <p:cSld>
+    <p:bg>
+      <p:bgPr>
+        <a:solidFill>
+          <a:schemeClr val="bg1"/>
+        </a:solidFill>
+        <a:effectLst/>
+      </p:bgPr>
+    </p:bg>
     <p:spTree>
       <p:nvGrpSpPr>
         <p:cNvPr id="1" name=""/>
@@ -5532,56 +5648,19 @@
           <a:chExt cx="0" cy="0"/>
         </a:xfrm>
       </p:grpSpPr>
-      <p:sp>
-        <p:nvSpPr>
-          <p:cNvPr id="6" name="Title 1">
-            <a:extLst>
-              <a:ext uri="{FF2B5EF4-FFF2-40B4-BE49-F238E27FC236}">
-                <a16:creationId xmlns:a16="http://schemas.microsoft.com/office/drawing/2014/main" id="{E82D0637-8936-451C-991F-309BFF136416}"/>
-              </a:ext>
-            </a:extLst>
-          </p:cNvPr>
-          <p:cNvSpPr>
-            <a:spLocks noGrp="1"/>
-          </p:cNvSpPr>
-          <p:nvPr>
-            <p:ph type="title"/>
-          </p:nvPr>
-        </p:nvSpPr>
-        <p:spPr>
-          <a:xfrm>
-            <a:off x="404261" y="18255"/>
-            <a:ext cx="11377061" cy="1325563"/>
-          </a:xfrm>
-        </p:spPr>
-        <p:txBody>
-          <a:bodyPr>
-            <a:normAutofit/>
-          </a:bodyPr>
-          <a:lstStyle/>
-          <a:p>
-            <a:r>
-              <a:rPr lang="en-US" sz="3200" dirty="0"/>
-              <a:t>Daily production fluctuates for solar power based on daylight hours and sun intensity.</a:t>
-            </a:r>
-          </a:p>
-        </p:txBody>
-      </p:sp>
       <p:pic>
         <p:nvPicPr>
-          <p:cNvPr id="7" name="Content Placeholder 6" descr="A screenshot of a cell phone&#10;&#10;Description automatically generated">
-            <a:extLst>
-              <a:ext uri="{FF2B5EF4-FFF2-40B4-BE49-F238E27FC236}">
-                <a16:creationId xmlns:a16="http://schemas.microsoft.com/office/drawing/2014/main" id="{DCC3BD65-9230-441D-A331-3993FA1BB733}"/>
+          <p:cNvPr id="5" name="Picture 4" descr="A screenshot of a cell phone&#10;&#10;Description automatically generated">
+            <a:extLst>
+              <a:ext uri="{FF2B5EF4-FFF2-40B4-BE49-F238E27FC236}">
+                <a16:creationId xmlns:a16="http://schemas.microsoft.com/office/drawing/2014/main" id="{C462FD90-3494-4055-A4E7-51056C5C28F0}"/>
               </a:ext>
             </a:extLst>
           </p:cNvPr>
           <p:cNvPicPr>
-            <a:picLocks noGrp="1" noChangeAspect="1"/>
+            <a:picLocks noChangeAspect="1"/>
           </p:cNvPicPr>
-          <p:nvPr>
-            <p:ph idx="1"/>
-          </p:nvPr>
+          <p:nvPr/>
         </p:nvPicPr>
         <p:blipFill>
           <a:blip r:embed="rId2">
@@ -5597,15 +5676,98 @@
         </p:blipFill>
         <p:spPr>
           <a:xfrm>
-            <a:off x="1337002" y="1343818"/>
-            <a:ext cx="9517997" cy="5297614"/>
+            <a:off x="1559859" y="68667"/>
+            <a:ext cx="11211713" cy="3107943"/>
           </a:xfrm>
+          <a:prstGeom prst="rect">
+            <a:avLst/>
+          </a:prstGeom>
         </p:spPr>
       </p:pic>
+      <p:pic>
+        <p:nvPicPr>
+          <p:cNvPr id="7" name="Picture 6" descr="A picture containing brush&#10;&#10;Description automatically generated">
+            <a:extLst>
+              <a:ext uri="{FF2B5EF4-FFF2-40B4-BE49-F238E27FC236}">
+                <a16:creationId xmlns:a16="http://schemas.microsoft.com/office/drawing/2014/main" id="{7C996982-AD39-4994-9C24-E6A706DB6A76}"/>
+              </a:ext>
+            </a:extLst>
+          </p:cNvPr>
+          <p:cNvPicPr>
+            <a:picLocks noChangeAspect="1"/>
+          </p:cNvPicPr>
+          <p:nvPr/>
+        </p:nvPicPr>
+        <p:blipFill>
+          <a:blip r:embed="rId3">
+            <a:extLst>
+              <a:ext uri="{28A0092B-C50C-407E-A947-70E740481C1C}">
+                <a14:useLocalDpi xmlns:a14="http://schemas.microsoft.com/office/drawing/2010/main" val="0"/>
+              </a:ext>
+            </a:extLst>
+          </a:blip>
+          <a:stretch>
+            <a:fillRect/>
+          </a:stretch>
+        </p:blipFill>
+        <p:spPr>
+          <a:xfrm>
+            <a:off x="1559859" y="3237883"/>
+            <a:ext cx="11211713" cy="3107943"/>
+          </a:xfrm>
+          <a:prstGeom prst="rect">
+            <a:avLst/>
+          </a:prstGeom>
+        </p:spPr>
+      </p:pic>
+      <p:sp>
+        <p:nvSpPr>
+          <p:cNvPr id="15" name="TextBox 14">
+            <a:extLst>
+              <a:ext uri="{FF2B5EF4-FFF2-40B4-BE49-F238E27FC236}">
+                <a16:creationId xmlns:a16="http://schemas.microsoft.com/office/drawing/2014/main" id="{535C677D-8D12-45B2-B87A-EEEBE87C6D33}"/>
+              </a:ext>
+            </a:extLst>
+          </p:cNvPr>
+          <p:cNvSpPr txBox="1"/>
+          <p:nvPr/>
+        </p:nvSpPr>
+        <p:spPr>
+          <a:xfrm>
+            <a:off x="273422" y="601773"/>
+            <a:ext cx="1739155" cy="3785652"/>
+          </a:xfrm>
+          <a:prstGeom prst="rect">
+            <a:avLst/>
+          </a:prstGeom>
+          <a:noFill/>
+        </p:spPr>
+        <p:txBody>
+          <a:bodyPr wrap="square" rtlCol="0">
+            <a:spAutoFit/>
+          </a:bodyPr>
+          <a:lstStyle/>
+          <a:p>
+            <a:r>
+              <a:rPr lang="en-US" sz="2000" dirty="0"/>
+              <a:t>Wind production hasn’t seen the same growth as solar power.  </a:t>
+            </a:r>
+          </a:p>
+          <a:p>
+            <a:endParaRPr lang="en-US" sz="2000" dirty="0"/>
+          </a:p>
+          <a:p>
+            <a:r>
+              <a:rPr lang="en-US" sz="2000" dirty="0"/>
+              <a:t>Wind production also fluctuates by hour and season.</a:t>
+            </a:r>
+          </a:p>
+        </p:txBody>
+      </p:sp>
     </p:spTree>
     <p:extLst>
       <p:ext uri="{BB962C8B-B14F-4D97-AF65-F5344CB8AC3E}">
-        <p14:creationId xmlns:p14="http://schemas.microsoft.com/office/powerpoint/2010/main" val="4071470031"/>
+        <p14:creationId xmlns:p14="http://schemas.microsoft.com/office/powerpoint/2010/main" val="3373516705"/>
       </p:ext>
     </p:extLst>
   </p:cSld>
@@ -5637,7 +5799,7 @@
           <p:cNvPr id="6" name="Title 1">
             <a:extLst>
               <a:ext uri="{FF2B5EF4-FFF2-40B4-BE49-F238E27FC236}">
-                <a16:creationId xmlns:a16="http://schemas.microsoft.com/office/drawing/2014/main" id="{A0831C76-8C71-4220-B246-9FF658021ADB}"/>
+                <a16:creationId xmlns:a16="http://schemas.microsoft.com/office/drawing/2014/main" id="{E82D0637-8936-451C-991F-309BFF136416}"/>
               </a:ext>
             </a:extLst>
           </p:cNvPr>
@@ -5662,12 +5824,8 @@
           <a:p>
             <a:r>
               <a:rPr lang="en-US" sz="3200" dirty="0"/>
-              <a:t>Wind power varies less and is most productive when solar is not.</a:t>
-            </a:r>
-            <a:br>
-              <a:rPr lang="en-US" sz="3200" dirty="0"/>
-            </a:br>
-            <a:endParaRPr lang="en-US" sz="3200" dirty="0"/>
+              <a:t>Daily production fluctuates for solar power based on daylight hours and sun intensity.</a:t>
+            </a:r>
           </a:p>
         </p:txBody>
       </p:sp>
@@ -5676,7 +5834,7 @@
           <p:cNvPr id="7" name="Content Placeholder 6" descr="A screenshot of a cell phone&#10;&#10;Description automatically generated">
             <a:extLst>
               <a:ext uri="{FF2B5EF4-FFF2-40B4-BE49-F238E27FC236}">
-                <a16:creationId xmlns:a16="http://schemas.microsoft.com/office/drawing/2014/main" id="{C9693274-A193-40BB-B825-ECF8E1AFC4D5}"/>
+                <a16:creationId xmlns:a16="http://schemas.microsoft.com/office/drawing/2014/main" id="{DCC3BD65-9230-441D-A331-3993FA1BB733}"/>
               </a:ext>
             </a:extLst>
           </p:cNvPr>
@@ -5701,15 +5859,15 @@
         </p:blipFill>
         <p:spPr>
           <a:xfrm>
-            <a:off x="1190023" y="1177050"/>
-            <a:ext cx="9811954" cy="5512507"/>
+            <a:off x="1337002" y="1343818"/>
+            <a:ext cx="9517997" cy="5297614"/>
           </a:xfrm>
         </p:spPr>
       </p:pic>
     </p:spTree>
     <p:extLst>
       <p:ext uri="{BB962C8B-B14F-4D97-AF65-F5344CB8AC3E}">
-        <p14:creationId xmlns:p14="http://schemas.microsoft.com/office/powerpoint/2010/main" val="1349563111"/>
+        <p14:creationId xmlns:p14="http://schemas.microsoft.com/office/powerpoint/2010/main" val="4071470031"/>
       </p:ext>
     </p:extLst>
   </p:cSld>

</xml_diff>

<commit_message>
Realized I was only plotting 2012-2017 rather than 2011-2017 like we had available in the data set.  Modified the word document to show change from 2011-2012. Made changes in notebook to make the years correct
</commit_message>
<xml_diff>
--- a/Renewable Energy Production in California.pptx
+++ b/Renewable Energy Production in California.pptx
@@ -271,7 +271,7 @@
           <a:p>
             <a:fld id="{BB9DC0CB-D0A9-4203-AA34-A91289CF0814}" type="datetimeFigureOut">
               <a:rPr lang="en-US" smtClean="0"/>
-              <a:t>11/6/2019</a:t>
+              <a:t>11/7/2019</a:t>
             </a:fld>
             <a:endParaRPr lang="en-US"/>
           </a:p>
@@ -469,7 +469,7 @@
           <a:p>
             <a:fld id="{BB9DC0CB-D0A9-4203-AA34-A91289CF0814}" type="datetimeFigureOut">
               <a:rPr lang="en-US" smtClean="0"/>
-              <a:t>11/6/2019</a:t>
+              <a:t>11/7/2019</a:t>
             </a:fld>
             <a:endParaRPr lang="en-US"/>
           </a:p>
@@ -677,7 +677,7 @@
           <a:p>
             <a:fld id="{BB9DC0CB-D0A9-4203-AA34-A91289CF0814}" type="datetimeFigureOut">
               <a:rPr lang="en-US" smtClean="0"/>
-              <a:t>11/6/2019</a:t>
+              <a:t>11/7/2019</a:t>
             </a:fld>
             <a:endParaRPr lang="en-US"/>
           </a:p>
@@ -875,7 +875,7 @@
           <a:p>
             <a:fld id="{BB9DC0CB-D0A9-4203-AA34-A91289CF0814}" type="datetimeFigureOut">
               <a:rPr lang="en-US" smtClean="0"/>
-              <a:t>11/6/2019</a:t>
+              <a:t>11/7/2019</a:t>
             </a:fld>
             <a:endParaRPr lang="en-US"/>
           </a:p>
@@ -1150,7 +1150,7 @@
           <a:p>
             <a:fld id="{BB9DC0CB-D0A9-4203-AA34-A91289CF0814}" type="datetimeFigureOut">
               <a:rPr lang="en-US" smtClean="0"/>
-              <a:t>11/6/2019</a:t>
+              <a:t>11/7/2019</a:t>
             </a:fld>
             <a:endParaRPr lang="en-US"/>
           </a:p>
@@ -1415,7 +1415,7 @@
           <a:p>
             <a:fld id="{BB9DC0CB-D0A9-4203-AA34-A91289CF0814}" type="datetimeFigureOut">
               <a:rPr lang="en-US" smtClean="0"/>
-              <a:t>11/6/2019</a:t>
+              <a:t>11/7/2019</a:t>
             </a:fld>
             <a:endParaRPr lang="en-US"/>
           </a:p>
@@ -1827,7 +1827,7 @@
           <a:p>
             <a:fld id="{BB9DC0CB-D0A9-4203-AA34-A91289CF0814}" type="datetimeFigureOut">
               <a:rPr lang="en-US" smtClean="0"/>
-              <a:t>11/6/2019</a:t>
+              <a:t>11/7/2019</a:t>
             </a:fld>
             <a:endParaRPr lang="en-US"/>
           </a:p>
@@ -1968,7 +1968,7 @@
           <a:p>
             <a:fld id="{BB9DC0CB-D0A9-4203-AA34-A91289CF0814}" type="datetimeFigureOut">
               <a:rPr lang="en-US" smtClean="0"/>
-              <a:t>11/6/2019</a:t>
+              <a:t>11/7/2019</a:t>
             </a:fld>
             <a:endParaRPr lang="en-US"/>
           </a:p>
@@ -2081,7 +2081,7 @@
           <a:p>
             <a:fld id="{BB9DC0CB-D0A9-4203-AA34-A91289CF0814}" type="datetimeFigureOut">
               <a:rPr lang="en-US" smtClean="0"/>
-              <a:t>11/6/2019</a:t>
+              <a:t>11/7/2019</a:t>
             </a:fld>
             <a:endParaRPr lang="en-US"/>
           </a:p>
@@ -2392,7 +2392,7 @@
           <a:p>
             <a:fld id="{BB9DC0CB-D0A9-4203-AA34-A91289CF0814}" type="datetimeFigureOut">
               <a:rPr lang="en-US" smtClean="0"/>
-              <a:t>11/6/2019</a:t>
+              <a:t>11/7/2019</a:t>
             </a:fld>
             <a:endParaRPr lang="en-US"/>
           </a:p>
@@ -2680,7 +2680,7 @@
           <a:p>
             <a:fld id="{BB9DC0CB-D0A9-4203-AA34-A91289CF0814}" type="datetimeFigureOut">
               <a:rPr lang="en-US" smtClean="0"/>
-              <a:t>11/6/2019</a:t>
+              <a:t>11/7/2019</a:t>
             </a:fld>
             <a:endParaRPr lang="en-US"/>
           </a:p>
@@ -2921,7 +2921,7 @@
           <a:p>
             <a:fld id="{BB9DC0CB-D0A9-4203-AA34-A91289CF0814}" type="datetimeFigureOut">
               <a:rPr lang="en-US" smtClean="0"/>
-              <a:t>11/6/2019</a:t>
+              <a:t>11/7/2019</a:t>
             </a:fld>
             <a:endParaRPr lang="en-US"/>
           </a:p>

</xml_diff>

<commit_message>
PowerPoint changes and fixed file saving location for images
</commit_message>
<xml_diff>
--- a/Renewable Energy Production in California.pptx
+++ b/Renewable Energy Production in California.pptx
@@ -12,12 +12,11 @@
     <p:sldId id="260" r:id="rId6"/>
     <p:sldId id="261" r:id="rId7"/>
     <p:sldId id="262" r:id="rId8"/>
-    <p:sldId id="269" r:id="rId9"/>
-    <p:sldId id="263" r:id="rId10"/>
-    <p:sldId id="264" r:id="rId11"/>
-    <p:sldId id="265" r:id="rId12"/>
-    <p:sldId id="266" r:id="rId13"/>
-    <p:sldId id="268" r:id="rId14"/>
+    <p:sldId id="263" r:id="rId9"/>
+    <p:sldId id="264" r:id="rId10"/>
+    <p:sldId id="265" r:id="rId11"/>
+    <p:sldId id="266" r:id="rId12"/>
+    <p:sldId id="268" r:id="rId13"/>
   </p:sldIdLst>
   <p:sldSz cx="12192000" cy="6858000"/>
   <p:notesSz cx="6858000" cy="9144000"/>
@@ -3854,7 +3853,7 @@
           <p:cNvPr id="6" name="Title 1">
             <a:extLst>
               <a:ext uri="{FF2B5EF4-FFF2-40B4-BE49-F238E27FC236}">
-                <a16:creationId xmlns:a16="http://schemas.microsoft.com/office/drawing/2014/main" id="{A0831C76-8C71-4220-B246-9FF658021ADB}"/>
+                <a16:creationId xmlns:a16="http://schemas.microsoft.com/office/drawing/2014/main" id="{A4B7AF37-CAD1-4D8B-B889-48D16C71E074}"/>
               </a:ext>
             </a:extLst>
           </p:cNvPr>
@@ -3879,12 +3878,8 @@
           <a:p>
             <a:r>
               <a:rPr lang="en-US" sz="3200" dirty="0"/>
-              <a:t>Wind power varies less and is most productive when solar is not.</a:t>
-            </a:r>
-            <a:br>
-              <a:rPr lang="en-US" sz="3200" dirty="0"/>
-            </a:br>
-            <a:endParaRPr lang="en-US" sz="3200" dirty="0"/>
+              <a:t>By 2017, California was close to the goal of 33% renewable energy production.</a:t>
+            </a:r>
           </a:p>
         </p:txBody>
       </p:sp>
@@ -3893,7 +3888,7 @@
           <p:cNvPr id="7" name="Content Placeholder 6" descr="A screenshot of a cell phone&#10;&#10;Description automatically generated">
             <a:extLst>
               <a:ext uri="{FF2B5EF4-FFF2-40B4-BE49-F238E27FC236}">
-                <a16:creationId xmlns:a16="http://schemas.microsoft.com/office/drawing/2014/main" id="{C9693274-A193-40BB-B825-ECF8E1AFC4D5}"/>
+                <a16:creationId xmlns:a16="http://schemas.microsoft.com/office/drawing/2014/main" id="{1CAB9A5A-9BC8-4E3B-9469-09551F0EE4AD}"/>
               </a:ext>
             </a:extLst>
           </p:cNvPr>
@@ -3918,15 +3913,15 @@
         </p:blipFill>
         <p:spPr>
           <a:xfrm>
-            <a:off x="1190023" y="1177050"/>
-            <a:ext cx="9811954" cy="5512507"/>
+            <a:off x="954505" y="1303733"/>
+            <a:ext cx="10282990" cy="5085696"/>
           </a:xfrm>
         </p:spPr>
       </p:pic>
     </p:spTree>
     <p:extLst>
       <p:ext uri="{BB962C8B-B14F-4D97-AF65-F5344CB8AC3E}">
-        <p14:creationId xmlns:p14="http://schemas.microsoft.com/office/powerpoint/2010/main" val="1349563111"/>
+        <p14:creationId xmlns:p14="http://schemas.microsoft.com/office/powerpoint/2010/main" val="3233333523"/>
       </p:ext>
     </p:extLst>
   </p:cSld>
@@ -3955,106 +3950,6 @@
       </p:grpSpPr>
       <p:sp>
         <p:nvSpPr>
-          <p:cNvPr id="6" name="Title 1">
-            <a:extLst>
-              <a:ext uri="{FF2B5EF4-FFF2-40B4-BE49-F238E27FC236}">
-                <a16:creationId xmlns:a16="http://schemas.microsoft.com/office/drawing/2014/main" id="{A4B7AF37-CAD1-4D8B-B889-48D16C71E074}"/>
-              </a:ext>
-            </a:extLst>
-          </p:cNvPr>
-          <p:cNvSpPr>
-            <a:spLocks noGrp="1"/>
-          </p:cNvSpPr>
-          <p:nvPr>
-            <p:ph type="title"/>
-          </p:nvPr>
-        </p:nvSpPr>
-        <p:spPr>
-          <a:xfrm>
-            <a:off x="404261" y="18255"/>
-            <a:ext cx="11377061" cy="1325563"/>
-          </a:xfrm>
-        </p:spPr>
-        <p:txBody>
-          <a:bodyPr>
-            <a:normAutofit/>
-          </a:bodyPr>
-          <a:lstStyle/>
-          <a:p>
-            <a:r>
-              <a:rPr lang="en-US" sz="3200" dirty="0"/>
-              <a:t>By 2017, California was close to the goal of 33% renewable energy production.</a:t>
-            </a:r>
-          </a:p>
-        </p:txBody>
-      </p:sp>
-      <p:pic>
-        <p:nvPicPr>
-          <p:cNvPr id="7" name="Content Placeholder 6" descr="A screenshot of a cell phone&#10;&#10;Description automatically generated">
-            <a:extLst>
-              <a:ext uri="{FF2B5EF4-FFF2-40B4-BE49-F238E27FC236}">
-                <a16:creationId xmlns:a16="http://schemas.microsoft.com/office/drawing/2014/main" id="{1CAB9A5A-9BC8-4E3B-9469-09551F0EE4AD}"/>
-              </a:ext>
-            </a:extLst>
-          </p:cNvPr>
-          <p:cNvPicPr>
-            <a:picLocks noGrp="1" noChangeAspect="1"/>
-          </p:cNvPicPr>
-          <p:nvPr>
-            <p:ph idx="1"/>
-          </p:nvPr>
-        </p:nvPicPr>
-        <p:blipFill>
-          <a:blip r:embed="rId2">
-            <a:extLst>
-              <a:ext uri="{28A0092B-C50C-407E-A947-70E740481C1C}">
-                <a14:useLocalDpi xmlns:a14="http://schemas.microsoft.com/office/drawing/2010/main" val="0"/>
-              </a:ext>
-            </a:extLst>
-          </a:blip>
-          <a:stretch>
-            <a:fillRect/>
-          </a:stretch>
-        </p:blipFill>
-        <p:spPr>
-          <a:xfrm>
-            <a:off x="954505" y="1303733"/>
-            <a:ext cx="10282990" cy="5085696"/>
-          </a:xfrm>
-        </p:spPr>
-      </p:pic>
-    </p:spTree>
-    <p:extLst>
-      <p:ext uri="{BB962C8B-B14F-4D97-AF65-F5344CB8AC3E}">
-        <p14:creationId xmlns:p14="http://schemas.microsoft.com/office/powerpoint/2010/main" val="3233333523"/>
-      </p:ext>
-    </p:extLst>
-  </p:cSld>
-  <p:clrMapOvr>
-    <a:masterClrMapping/>
-  </p:clrMapOvr>
-</p:sld>
-</file>
-
-<file path=ppt/slides/slide12.xml><?xml version="1.0" encoding="utf-8"?>
-<p:sld xmlns:a="http://schemas.openxmlformats.org/drawingml/2006/main" xmlns:r="http://schemas.openxmlformats.org/officeDocument/2006/relationships" xmlns:p="http://schemas.openxmlformats.org/presentationml/2006/main">
-  <p:cSld>
-    <p:spTree>
-      <p:nvGrpSpPr>
-        <p:cNvPr id="1" name=""/>
-        <p:cNvGrpSpPr/>
-        <p:nvPr/>
-      </p:nvGrpSpPr>
-      <p:grpSpPr>
-        <a:xfrm>
-          <a:off x="0" y="0"/>
-          <a:ext cx="0" cy="0"/>
-          <a:chOff x="0" y="0"/>
-          <a:chExt cx="0" cy="0"/>
-        </a:xfrm>
-      </p:grpSpPr>
-      <p:sp>
-        <p:nvSpPr>
           <p:cNvPr id="9" name="Title 1">
             <a:extLst>
               <a:ext uri="{FF2B5EF4-FFF2-40B4-BE49-F238E27FC236}">
@@ -4136,7 +4031,7 @@
 </p:sld>
 </file>
 
-<file path=ppt/slides/slide13.xml><?xml version="1.0" encoding="utf-8"?>
+<file path=ppt/slides/slide12.xml><?xml version="1.0" encoding="utf-8"?>
 <p:sld xmlns:a="http://schemas.openxmlformats.org/drawingml/2006/main" xmlns:r="http://schemas.openxmlformats.org/officeDocument/2006/relationships" xmlns:p="http://schemas.openxmlformats.org/presentationml/2006/main">
   <p:cSld>
     <p:bg>
@@ -4738,7 +4633,7 @@
             </a:pPr>
             <a:r>
               <a:rPr lang="en-US" sz="3200" dirty="0"/>
-              <a:t>California has a goal of 33% renewable energy production by 2020, up from 20% in 2011.</a:t>
+              <a:t>California has a goal of 33% renewable energy production by 2020, up from 13% in 2011.</a:t>
             </a:r>
           </a:p>
           <a:p>
@@ -5231,6 +5126,13 @@
             <a:r>
               <a:rPr lang="en-US" sz="3200" dirty="0"/>
               <a:t>Recent data availability</a:t>
+            </a:r>
+          </a:p>
+          <a:p>
+            <a:pPr lvl="0"/>
+            <a:r>
+              <a:rPr lang="en-US" sz="3200" dirty="0"/>
+              <a:t>Challenges with git repository management </a:t>
             </a:r>
           </a:p>
           <a:p>
@@ -5626,14 +5528,6 @@
 <file path=ppt/slides/slide8.xml><?xml version="1.0" encoding="utf-8"?>
 <p:sld xmlns:a="http://schemas.openxmlformats.org/drawingml/2006/main" xmlns:r="http://schemas.openxmlformats.org/officeDocument/2006/relationships" xmlns:p="http://schemas.openxmlformats.org/presentationml/2006/main">
   <p:cSld>
-    <p:bg>
-      <p:bgPr>
-        <a:solidFill>
-          <a:schemeClr val="bg1"/>
-        </a:solidFill>
-        <a:effectLst/>
-      </p:bgPr>
-    </p:bg>
     <p:spTree>
       <p:nvGrpSpPr>
         <p:cNvPr id="1" name=""/>
@@ -5648,19 +5542,56 @@
           <a:chExt cx="0" cy="0"/>
         </a:xfrm>
       </p:grpSpPr>
+      <p:sp>
+        <p:nvSpPr>
+          <p:cNvPr id="6" name="Title 1">
+            <a:extLst>
+              <a:ext uri="{FF2B5EF4-FFF2-40B4-BE49-F238E27FC236}">
+                <a16:creationId xmlns:a16="http://schemas.microsoft.com/office/drawing/2014/main" id="{E82D0637-8936-451C-991F-309BFF136416}"/>
+              </a:ext>
+            </a:extLst>
+          </p:cNvPr>
+          <p:cNvSpPr>
+            <a:spLocks noGrp="1"/>
+          </p:cNvSpPr>
+          <p:nvPr>
+            <p:ph type="title"/>
+          </p:nvPr>
+        </p:nvSpPr>
+        <p:spPr>
+          <a:xfrm>
+            <a:off x="404261" y="18255"/>
+            <a:ext cx="11377061" cy="1325563"/>
+          </a:xfrm>
+        </p:spPr>
+        <p:txBody>
+          <a:bodyPr>
+            <a:normAutofit/>
+          </a:bodyPr>
+          <a:lstStyle/>
+          <a:p>
+            <a:r>
+              <a:rPr lang="en-US" sz="3200" dirty="0"/>
+              <a:t>Daily production fluctuates for solar power based on daylight hours and sun intensity.</a:t>
+            </a:r>
+          </a:p>
+        </p:txBody>
+      </p:sp>
       <p:pic>
         <p:nvPicPr>
-          <p:cNvPr id="5" name="Picture 4" descr="A screenshot of a cell phone&#10;&#10;Description automatically generated">
-            <a:extLst>
-              <a:ext uri="{FF2B5EF4-FFF2-40B4-BE49-F238E27FC236}">
-                <a16:creationId xmlns:a16="http://schemas.microsoft.com/office/drawing/2014/main" id="{C462FD90-3494-4055-A4E7-51056C5C28F0}"/>
+          <p:cNvPr id="7" name="Content Placeholder 6" descr="A screenshot of a cell phone&#10;&#10;Description automatically generated">
+            <a:extLst>
+              <a:ext uri="{FF2B5EF4-FFF2-40B4-BE49-F238E27FC236}">
+                <a16:creationId xmlns:a16="http://schemas.microsoft.com/office/drawing/2014/main" id="{DCC3BD65-9230-441D-A331-3993FA1BB733}"/>
               </a:ext>
             </a:extLst>
           </p:cNvPr>
           <p:cNvPicPr>
-            <a:picLocks noChangeAspect="1"/>
+            <a:picLocks noGrp="1" noChangeAspect="1"/>
           </p:cNvPicPr>
-          <p:nvPr/>
+          <p:nvPr>
+            <p:ph idx="1"/>
+          </p:nvPr>
         </p:nvPicPr>
         <p:blipFill>
           <a:blip r:embed="rId2">
@@ -5676,98 +5607,15 @@
         </p:blipFill>
         <p:spPr>
           <a:xfrm>
-            <a:off x="1559859" y="68667"/>
-            <a:ext cx="11211713" cy="3107943"/>
+            <a:off x="1337002" y="1343818"/>
+            <a:ext cx="9517997" cy="5297614"/>
           </a:xfrm>
-          <a:prstGeom prst="rect">
-            <a:avLst/>
-          </a:prstGeom>
         </p:spPr>
       </p:pic>
-      <p:pic>
-        <p:nvPicPr>
-          <p:cNvPr id="7" name="Picture 6" descr="A picture containing brush&#10;&#10;Description automatically generated">
-            <a:extLst>
-              <a:ext uri="{FF2B5EF4-FFF2-40B4-BE49-F238E27FC236}">
-                <a16:creationId xmlns:a16="http://schemas.microsoft.com/office/drawing/2014/main" id="{7C996982-AD39-4994-9C24-E6A706DB6A76}"/>
-              </a:ext>
-            </a:extLst>
-          </p:cNvPr>
-          <p:cNvPicPr>
-            <a:picLocks noChangeAspect="1"/>
-          </p:cNvPicPr>
-          <p:nvPr/>
-        </p:nvPicPr>
-        <p:blipFill>
-          <a:blip r:embed="rId3">
-            <a:extLst>
-              <a:ext uri="{28A0092B-C50C-407E-A947-70E740481C1C}">
-                <a14:useLocalDpi xmlns:a14="http://schemas.microsoft.com/office/drawing/2010/main" val="0"/>
-              </a:ext>
-            </a:extLst>
-          </a:blip>
-          <a:stretch>
-            <a:fillRect/>
-          </a:stretch>
-        </p:blipFill>
-        <p:spPr>
-          <a:xfrm>
-            <a:off x="1559859" y="3237883"/>
-            <a:ext cx="11211713" cy="3107943"/>
-          </a:xfrm>
-          <a:prstGeom prst="rect">
-            <a:avLst/>
-          </a:prstGeom>
-        </p:spPr>
-      </p:pic>
-      <p:sp>
-        <p:nvSpPr>
-          <p:cNvPr id="15" name="TextBox 14">
-            <a:extLst>
-              <a:ext uri="{FF2B5EF4-FFF2-40B4-BE49-F238E27FC236}">
-                <a16:creationId xmlns:a16="http://schemas.microsoft.com/office/drawing/2014/main" id="{535C677D-8D12-45B2-B87A-EEEBE87C6D33}"/>
-              </a:ext>
-            </a:extLst>
-          </p:cNvPr>
-          <p:cNvSpPr txBox="1"/>
-          <p:nvPr/>
-        </p:nvSpPr>
-        <p:spPr>
-          <a:xfrm>
-            <a:off x="273422" y="601773"/>
-            <a:ext cx="1739155" cy="3785652"/>
-          </a:xfrm>
-          <a:prstGeom prst="rect">
-            <a:avLst/>
-          </a:prstGeom>
-          <a:noFill/>
-        </p:spPr>
-        <p:txBody>
-          <a:bodyPr wrap="square" rtlCol="0">
-            <a:spAutoFit/>
-          </a:bodyPr>
-          <a:lstStyle/>
-          <a:p>
-            <a:r>
-              <a:rPr lang="en-US" sz="2000" dirty="0"/>
-              <a:t>Wind production hasn’t seen the same growth as solar power.  </a:t>
-            </a:r>
-          </a:p>
-          <a:p>
-            <a:endParaRPr lang="en-US" sz="2000" dirty="0"/>
-          </a:p>
-          <a:p>
-            <a:r>
-              <a:rPr lang="en-US" sz="2000" dirty="0"/>
-              <a:t>Wind production also fluctuates by hour and season.</a:t>
-            </a:r>
-          </a:p>
-        </p:txBody>
-      </p:sp>
     </p:spTree>
     <p:extLst>
       <p:ext uri="{BB962C8B-B14F-4D97-AF65-F5344CB8AC3E}">
-        <p14:creationId xmlns:p14="http://schemas.microsoft.com/office/powerpoint/2010/main" val="3373516705"/>
+        <p14:creationId xmlns:p14="http://schemas.microsoft.com/office/powerpoint/2010/main" val="4071470031"/>
       </p:ext>
     </p:extLst>
   </p:cSld>
@@ -5799,7 +5647,7 @@
           <p:cNvPr id="6" name="Title 1">
             <a:extLst>
               <a:ext uri="{FF2B5EF4-FFF2-40B4-BE49-F238E27FC236}">
-                <a16:creationId xmlns:a16="http://schemas.microsoft.com/office/drawing/2014/main" id="{E82D0637-8936-451C-991F-309BFF136416}"/>
+                <a16:creationId xmlns:a16="http://schemas.microsoft.com/office/drawing/2014/main" id="{A0831C76-8C71-4220-B246-9FF658021ADB}"/>
               </a:ext>
             </a:extLst>
           </p:cNvPr>
@@ -5824,8 +5672,12 @@
           <a:p>
             <a:r>
               <a:rPr lang="en-US" sz="3200" dirty="0"/>
-              <a:t>Daily production fluctuates for solar power based on daylight hours and sun intensity.</a:t>
-            </a:r>
+              <a:t>Wind power varies less and is most productive when solar is not.</a:t>
+            </a:r>
+            <a:br>
+              <a:rPr lang="en-US" sz="3200" dirty="0"/>
+            </a:br>
+            <a:endParaRPr lang="en-US" sz="3200" dirty="0"/>
           </a:p>
         </p:txBody>
       </p:sp>
@@ -5834,7 +5686,7 @@
           <p:cNvPr id="7" name="Content Placeholder 6" descr="A screenshot of a cell phone&#10;&#10;Description automatically generated">
             <a:extLst>
               <a:ext uri="{FF2B5EF4-FFF2-40B4-BE49-F238E27FC236}">
-                <a16:creationId xmlns:a16="http://schemas.microsoft.com/office/drawing/2014/main" id="{DCC3BD65-9230-441D-A331-3993FA1BB733}"/>
+                <a16:creationId xmlns:a16="http://schemas.microsoft.com/office/drawing/2014/main" id="{C9693274-A193-40BB-B825-ECF8E1AFC4D5}"/>
               </a:ext>
             </a:extLst>
           </p:cNvPr>
@@ -5859,15 +5711,15 @@
         </p:blipFill>
         <p:spPr>
           <a:xfrm>
-            <a:off x="1337002" y="1343818"/>
-            <a:ext cx="9517997" cy="5297614"/>
+            <a:off x="1190023" y="1177050"/>
+            <a:ext cx="9811954" cy="5512507"/>
           </a:xfrm>
         </p:spPr>
       </p:pic>
     </p:spTree>
     <p:extLst>
       <p:ext uri="{BB962C8B-B14F-4D97-AF65-F5344CB8AC3E}">
-        <p14:creationId xmlns:p14="http://schemas.microsoft.com/office/powerpoint/2010/main" val="4071470031"/>
+        <p14:creationId xmlns:p14="http://schemas.microsoft.com/office/powerpoint/2010/main" val="1349563111"/>
       </p:ext>
     </p:extLst>
   </p:cSld>

</xml_diff>